<commit_message>
42 Lausanne | SANA | 20/12/2023 13:13:40.49
</commit_message>
<xml_diff>
--- a/Presentation/20122023-lab4tech/03 - Presentation IPv6-final.pptx
+++ b/Presentation/20122023-lab4tech/03 - Presentation IPv6-final.pptx
@@ -5,13 +5,9 @@
     <p:sldMasterId id="2147483648" r:id="rId1"/>
   </p:sldMasterIdLst>
   <p:sldIdLst>
-    <p:sldId id="256" r:id="rId2"/>
-    <p:sldId id="257" r:id="rId3"/>
-    <p:sldId id="258" r:id="rId4"/>
-    <p:sldId id="259" r:id="rId5"/>
-    <p:sldId id="260" r:id="rId6"/>
-    <p:sldId id="261" r:id="rId7"/>
-    <p:sldId id="262" r:id="rId8"/>
+    <p:sldId id="263" r:id="rId2"/>
+    <p:sldId id="261" r:id="rId3"/>
+    <p:sldId id="262" r:id="rId4"/>
   </p:sldIdLst>
   <p:sldSz cx="12192000" cy="6858000"/>
   <p:notesSz cx="6858000" cy="9144000"/>
@@ -3340,190 +3336,129 @@
           <a:chExt cx="0" cy="0"/>
         </a:xfrm>
       </p:grpSpPr>
-      <p:pic>
-        <p:nvPicPr>
-          <p:cNvPr id="5" name="Image 4" descr="Une image contenant personne, Appareils électroniques, intérieur, texte&#10;&#10;Description générée automatiquement">
-            <a:extLst>
-              <a:ext uri="{FF2B5EF4-FFF2-40B4-BE49-F238E27FC236}">
-                <a16:creationId xmlns:a16="http://schemas.microsoft.com/office/drawing/2014/main" id="{53C494F3-CDAF-152E-A41D-8AB4BFF66FD4}"/>
-              </a:ext>
-            </a:extLst>
-          </p:cNvPr>
-          <p:cNvPicPr>
-            <a:picLocks noChangeAspect="1"/>
-          </p:cNvPicPr>
-          <p:nvPr/>
-        </p:nvPicPr>
-        <p:blipFill>
-          <a:blip r:embed="rId2">
-            <a:extLst>
-              <a:ext uri="{28A0092B-C50C-407E-A947-70E740481C1C}">
-                <a14:useLocalDpi xmlns:a14="http://schemas.microsoft.com/office/drawing/2010/main" val="0"/>
-              </a:ext>
-            </a:extLst>
-          </a:blip>
-          <a:stretch>
-            <a:fillRect/>
-          </a:stretch>
-        </p:blipFill>
-        <p:spPr>
-          <a:xfrm>
-            <a:off x="0" y="-547006"/>
-            <a:ext cx="12192000" cy="8125968"/>
-          </a:xfrm>
-          <a:prstGeom prst="rect">
-            <a:avLst/>
-          </a:prstGeom>
-        </p:spPr>
-      </p:pic>
       <p:sp>
         <p:nvSpPr>
           <p:cNvPr id="2" name="Titre 1">
             <a:extLst>
               <a:ext uri="{FF2B5EF4-FFF2-40B4-BE49-F238E27FC236}">
-                <a16:creationId xmlns:a16="http://schemas.microsoft.com/office/drawing/2014/main" id="{CFAE1642-A8DC-2F08-D2E5-8A1C84D885B3}"/>
-              </a:ext>
-            </a:extLst>
-          </p:cNvPr>
-          <p:cNvSpPr>
-            <a:spLocks noGrp="1"/>
-          </p:cNvSpPr>
-          <p:nvPr>
-            <p:ph type="ctrTitle"/>
-          </p:nvPr>
-        </p:nvSpPr>
-        <p:spPr>
-          <a:xfrm>
-            <a:off x="96252" y="54142"/>
-            <a:ext cx="7818521" cy="1073568"/>
-          </a:xfrm>
-        </p:spPr>
-        <p:txBody>
-          <a:bodyPr/>
-          <a:lstStyle/>
-          <a:p>
-            <a:r>
-              <a:rPr lang="en-US" dirty="0">
-                <a:solidFill>
-                  <a:schemeClr val="bg1"/>
-                </a:solidFill>
+                <a16:creationId xmlns:a16="http://schemas.microsoft.com/office/drawing/2014/main" id="{C95AC394-ACCF-6A10-D306-A184F8082DCD}"/>
+              </a:ext>
+            </a:extLst>
+          </p:cNvPr>
+          <p:cNvSpPr>
+            <a:spLocks noGrp="1"/>
+          </p:cNvSpPr>
+          <p:nvPr>
+            <p:ph type="title"/>
+          </p:nvPr>
+        </p:nvSpPr>
+        <p:spPr/>
+        <p:txBody>
+          <a:bodyPr/>
+          <a:lstStyle/>
+          <a:p>
+            <a:r>
+              <a:rPr lang="fr-FR" dirty="0">
                 <a:latin typeface="Arial Black" panose="020B0A04020102020204" pitchFamily="34" charset="0"/>
               </a:rPr>
-              <a:t>Introduction IPv6</a:t>
-            </a:r>
-            <a:endParaRPr lang="fr-FR" dirty="0">
-              <a:solidFill>
-                <a:schemeClr val="bg1"/>
-              </a:solidFill>
-              <a:latin typeface="Arial Black" panose="020B0A04020102020204" pitchFamily="34" charset="0"/>
-            </a:endParaRPr>
-          </a:p>
-        </p:txBody>
-      </p:sp>
-      <p:sp>
-        <p:nvSpPr>
-          <p:cNvPr id="3" name="Sous-titre 2">
-            <a:extLst>
-              <a:ext uri="{FF2B5EF4-FFF2-40B4-BE49-F238E27FC236}">
-                <a16:creationId xmlns:a16="http://schemas.microsoft.com/office/drawing/2014/main" id="{FAB06056-3DDD-13AE-6E33-1375932702FC}"/>
-              </a:ext>
-            </a:extLst>
-          </p:cNvPr>
-          <p:cNvSpPr>
-            <a:spLocks noGrp="1"/>
-          </p:cNvSpPr>
-          <p:nvPr>
-            <p:ph type="subTitle" idx="1"/>
-          </p:nvPr>
-        </p:nvSpPr>
-        <p:spPr>
-          <a:xfrm>
-            <a:off x="234615" y="3212432"/>
-            <a:ext cx="9976184" cy="3645568"/>
-          </a:xfrm>
-        </p:spPr>
-        <p:txBody>
-          <a:bodyPr>
-            <a:normAutofit/>
-          </a:bodyPr>
-          <a:lstStyle/>
-          <a:p>
-            <a:pPr algn="l"/>
-            <a:r>
-              <a:rPr lang="fr-FR" sz="3200" dirty="0">
-                <a:solidFill>
-                  <a:schemeClr val="bg1"/>
-                </a:solidFill>
+              <a:t>Notes et références</a:t>
+            </a:r>
+          </a:p>
+        </p:txBody>
+      </p:sp>
+      <p:sp>
+        <p:nvSpPr>
+          <p:cNvPr id="3" name="Espace réservé du contenu 2">
+            <a:extLst>
+              <a:ext uri="{FF2B5EF4-FFF2-40B4-BE49-F238E27FC236}">
+                <a16:creationId xmlns:a16="http://schemas.microsoft.com/office/drawing/2014/main" id="{2C595172-A7E3-1B83-98AC-8E492C8D9E54}"/>
+              </a:ext>
+            </a:extLst>
+          </p:cNvPr>
+          <p:cNvSpPr>
+            <a:spLocks noGrp="1"/>
+          </p:cNvSpPr>
+          <p:nvPr>
+            <p:ph idx="1"/>
+          </p:nvPr>
+        </p:nvSpPr>
+        <p:spPr/>
+        <p:txBody>
+          <a:bodyPr/>
+          <a:lstStyle/>
+          <a:p>
+            <a:r>
+              <a:rPr lang="fr-FR" dirty="0">
+                <a:hlinkClick r:id="rId2"/>
               </a:rPr>
-              <a:t>- Présentation</a:t>
-            </a:r>
-          </a:p>
-          <a:p>
-            <a:pPr algn="l"/>
-            <a:r>
-              <a:rPr lang="fr-FR" sz="3200" dirty="0">
-                <a:solidFill>
-                  <a:schemeClr val="bg1"/>
-                </a:solidFill>
+              <a:t>https://skillsforall.com</a:t>
+            </a:r>
+            <a:endParaRPr lang="fr-FR" dirty="0"/>
+          </a:p>
+          <a:p>
+            <a:r>
+              <a:rPr lang="fr-FR" dirty="0">
+                <a:hlinkClick r:id="rId3"/>
               </a:rPr>
-              <a:t>- Différence entre IPv4 ou IPv6</a:t>
-            </a:r>
-          </a:p>
-          <a:p>
-            <a:pPr algn="l"/>
-            <a:r>
-              <a:rPr lang="fr-FR" sz="3200" dirty="0">
-                <a:solidFill>
-                  <a:schemeClr val="bg1"/>
-                </a:solidFill>
+              <a:t>https://www.youtube.com/@ultraconfig9489</a:t>
+            </a:r>
+            <a:endParaRPr lang="fr-FR" dirty="0"/>
+          </a:p>
+          <a:p>
+            <a:pPr marL="0" indent="0">
+              <a:buNone/>
+            </a:pPr>
+            <a:endParaRPr lang="fr-FR" dirty="0"/>
+          </a:p>
+          <a:p>
+            <a:pPr marL="0" indent="0">
+              <a:buNone/>
+            </a:pPr>
+            <a:endParaRPr lang="fr-FR" dirty="0"/>
+          </a:p>
+          <a:p>
+            <a:pPr marL="0" indent="0">
+              <a:buNone/>
+            </a:pPr>
+            <a:endParaRPr lang="fr-FR" dirty="0"/>
+          </a:p>
+          <a:p>
+            <a:pPr marL="0" indent="0">
+              <a:buNone/>
+            </a:pPr>
+            <a:r>
+              <a:rPr lang="fr-FR" dirty="0">
+                <a:latin typeface="Arial Black" panose="020B0A04020102020204" pitchFamily="34" charset="0"/>
               </a:rPr>
-              <a:t>- Configuration d’un router en IPv6 avec </a:t>
-            </a:r>
-            <a:r>
-              <a:rPr lang="fr-FR" sz="3200" dirty="0" err="1">
-                <a:solidFill>
-                  <a:schemeClr val="bg1"/>
-                </a:solidFill>
+              <a:t>Merci à toutes les personnes qui m'ont aidé</a:t>
+            </a:r>
+          </a:p>
+          <a:p>
+            <a:pPr marL="0" indent="0">
+              <a:buNone/>
+            </a:pPr>
+            <a:r>
+              <a:rPr lang="fr-FR" dirty="0">
+                <a:latin typeface="Arial Black" panose="020B0A04020102020204" pitchFamily="34" charset="0"/>
               </a:rPr>
-              <a:t>Packet</a:t>
-            </a:r>
-            <a:r>
-              <a:rPr lang="fr-FR" sz="3200" dirty="0">
-                <a:solidFill>
-                  <a:schemeClr val="bg1"/>
-                </a:solidFill>
-              </a:rPr>
-              <a:t> traceur</a:t>
-            </a:r>
-          </a:p>
-          <a:p>
-            <a:pPr algn="l"/>
-            <a:r>
-              <a:rPr lang="fr-FR" sz="3200" dirty="0">
-                <a:solidFill>
-                  <a:schemeClr val="bg1"/>
-                </a:solidFill>
-              </a:rPr>
-              <a:t>- Configuration et test finale du réseau </a:t>
-            </a:r>
-          </a:p>
-          <a:p>
-            <a:pPr algn="l"/>
-            <a:r>
-              <a:rPr lang="fr-FR" sz="3200" dirty="0">
-                <a:solidFill>
-                  <a:schemeClr val="bg1"/>
-                </a:solidFill>
-              </a:rPr>
-              <a:t>- Conclusion et questions</a:t>
-            </a:r>
+              <a:t>dans cette présentation. </a:t>
+            </a:r>
+          </a:p>
+          <a:p>
+            <a:pPr marL="0" indent="0">
+              <a:buNone/>
+            </a:pPr>
+            <a:endParaRPr lang="fr-FR" dirty="0"/>
+          </a:p>
+          <a:p>
+            <a:endParaRPr lang="fr-FR" dirty="0"/>
           </a:p>
         </p:txBody>
       </p:sp>
     </p:spTree>
     <p:extLst>
       <p:ext uri="{BB962C8B-B14F-4D97-AF65-F5344CB8AC3E}">
-        <p14:creationId xmlns:p14="http://schemas.microsoft.com/office/powerpoint/2010/main" val="518939545"/>
+        <p14:creationId xmlns:p14="http://schemas.microsoft.com/office/powerpoint/2010/main" val="2528212542"/>
       </p:ext>
     </p:extLst>
   </p:cSld>
@@ -3550,771 +3485,12 @@
           <a:chExt cx="0" cy="0"/>
         </a:xfrm>
       </p:grpSpPr>
-      <p:sp>
-        <p:nvSpPr>
-          <p:cNvPr id="2" name="Titre 1">
-            <a:extLst>
-              <a:ext uri="{FF2B5EF4-FFF2-40B4-BE49-F238E27FC236}">
-                <a16:creationId xmlns:a16="http://schemas.microsoft.com/office/drawing/2014/main" id="{36947EFC-7B56-64E4-C354-CC0C2D1EC11F}"/>
-              </a:ext>
-            </a:extLst>
-          </p:cNvPr>
-          <p:cNvSpPr>
-            <a:spLocks noGrp="1"/>
-          </p:cNvSpPr>
-          <p:nvPr>
-            <p:ph type="title"/>
-          </p:nvPr>
-        </p:nvSpPr>
-        <p:spPr/>
-        <p:txBody>
-          <a:bodyPr/>
-          <a:lstStyle/>
-          <a:p>
-            <a:r>
-              <a:rPr lang="fr-FR" b="0" i="0" dirty="0">
-                <a:solidFill>
-                  <a:srgbClr val="2F3237"/>
-                </a:solidFill>
-                <a:effectLst/>
-                <a:latin typeface="LanguageTool-win"/>
-              </a:rPr>
-              <a:t>Structure d'une adresse IPv6</a:t>
-            </a:r>
-            <a:endParaRPr lang="fr-FR" dirty="0"/>
-          </a:p>
-        </p:txBody>
-      </p:sp>
-      <p:sp>
-        <p:nvSpPr>
-          <p:cNvPr id="3" name="Espace réservé du contenu 2">
-            <a:extLst>
-              <a:ext uri="{FF2B5EF4-FFF2-40B4-BE49-F238E27FC236}">
-                <a16:creationId xmlns:a16="http://schemas.microsoft.com/office/drawing/2014/main" id="{7F030942-C6DD-AF29-21EB-AE681E5311A2}"/>
-              </a:ext>
-            </a:extLst>
-          </p:cNvPr>
-          <p:cNvSpPr>
-            <a:spLocks noGrp="1"/>
-          </p:cNvSpPr>
-          <p:nvPr>
-            <p:ph idx="1"/>
-          </p:nvPr>
-        </p:nvSpPr>
-        <p:spPr/>
-        <p:txBody>
-          <a:bodyPr/>
-          <a:lstStyle/>
-          <a:p>
-            <a:pPr marL="0" indent="0">
-              <a:buNone/>
-            </a:pPr>
-            <a:r>
-              <a:rPr lang="fr-FR" b="0" i="0" dirty="0">
-                <a:solidFill>
-                  <a:srgbClr val="000000"/>
-                </a:solidFill>
-                <a:effectLst/>
-                <a:latin typeface="Arial" panose="020B0604020202020204" pitchFamily="34" charset="0"/>
-              </a:rPr>
-              <a:t>2001:db8:1:1</a:t>
-            </a:r>
-            <a:r>
-              <a:rPr lang="am-ET" b="0" i="0" dirty="0">
-                <a:solidFill>
-                  <a:srgbClr val="000000"/>
-                </a:solidFill>
-                <a:effectLst/>
-                <a:latin typeface="Arial" panose="020B0604020202020204" pitchFamily="34" charset="0"/>
-              </a:rPr>
-              <a:t>።1/64</a:t>
-            </a:r>
-            <a:endParaRPr lang="en-US" b="0" i="0" dirty="0">
-              <a:solidFill>
-                <a:srgbClr val="000000"/>
-              </a:solidFill>
-              <a:effectLst/>
-              <a:latin typeface="Arial" panose="020B0604020202020204" pitchFamily="34" charset="0"/>
-            </a:endParaRPr>
-          </a:p>
-          <a:p>
-            <a:r>
-              <a:rPr lang="fr-FR" dirty="0"/>
-              <a:t>Adresse fournit par le « ISP »</a:t>
-            </a:r>
-          </a:p>
-          <a:p>
-            <a:pPr marL="0" indent="0">
-              <a:buNone/>
-            </a:pPr>
-            <a:endParaRPr lang="fr-FR" dirty="0"/>
-          </a:p>
-          <a:p>
-            <a:pPr marL="0" indent="0">
-              <a:buNone/>
-            </a:pPr>
-            <a:r>
-              <a:rPr lang="en-US" dirty="0"/>
-              <a:t>2001:DB8:1:1:207:ECFF:FE29:D35A</a:t>
-            </a:r>
-          </a:p>
-          <a:p>
-            <a:r>
-              <a:rPr lang="fr-FR" dirty="0"/>
-              <a:t>Adresse Complète</a:t>
-            </a:r>
-          </a:p>
-          <a:p>
-            <a:pPr marL="0" indent="0">
-              <a:buNone/>
-            </a:pPr>
-            <a:endParaRPr lang="fr-FR" dirty="0"/>
-          </a:p>
-          <a:p>
-            <a:pPr marL="0" indent="0">
-              <a:buNone/>
-            </a:pPr>
-            <a:r>
-              <a:rPr lang="fr-FR" dirty="0"/>
-              <a:t>fe80::1</a:t>
-            </a:r>
-          </a:p>
-          <a:p>
-            <a:r>
-              <a:rPr lang="fr-FR" dirty="0"/>
-              <a:t>Adresse  de lien local</a:t>
-            </a:r>
-          </a:p>
-        </p:txBody>
-      </p:sp>
-    </p:spTree>
-    <p:extLst>
-      <p:ext uri="{BB962C8B-B14F-4D97-AF65-F5344CB8AC3E}">
-        <p14:creationId xmlns:p14="http://schemas.microsoft.com/office/powerpoint/2010/main" val="3741782176"/>
-      </p:ext>
-    </p:extLst>
-  </p:cSld>
-  <p:clrMapOvr>
-    <a:masterClrMapping/>
-  </p:clrMapOvr>
-</p:sld>
-</file>
-
-<file path=ppt/slides/slide3.xml><?xml version="1.0" encoding="utf-8"?>
-<p:sld xmlns:a="http://schemas.openxmlformats.org/drawingml/2006/main" xmlns:r="http://schemas.openxmlformats.org/officeDocument/2006/relationships" xmlns:p="http://schemas.openxmlformats.org/presentationml/2006/main">
-  <p:cSld>
-    <p:spTree>
-      <p:nvGrpSpPr>
-        <p:cNvPr id="1" name=""/>
-        <p:cNvGrpSpPr/>
-        <p:nvPr/>
-      </p:nvGrpSpPr>
-      <p:grpSpPr>
-        <a:xfrm>
-          <a:off x="0" y="0"/>
-          <a:ext cx="0" cy="0"/>
-          <a:chOff x="0" y="0"/>
-          <a:chExt cx="0" cy="0"/>
-        </a:xfrm>
-      </p:grpSpPr>
-      <p:sp>
-        <p:nvSpPr>
-          <p:cNvPr id="2" name="Titre 1">
-            <a:extLst>
-              <a:ext uri="{FF2B5EF4-FFF2-40B4-BE49-F238E27FC236}">
-                <a16:creationId xmlns:a16="http://schemas.microsoft.com/office/drawing/2014/main" id="{F0A66589-518B-E0BB-9B91-74F46718B7C7}"/>
-              </a:ext>
-            </a:extLst>
-          </p:cNvPr>
-          <p:cNvSpPr>
-            <a:spLocks noGrp="1"/>
-          </p:cNvSpPr>
-          <p:nvPr>
-            <p:ph type="title"/>
-          </p:nvPr>
-        </p:nvSpPr>
-        <p:spPr/>
-        <p:txBody>
-          <a:bodyPr/>
-          <a:lstStyle/>
-          <a:p>
-            <a:r>
-              <a:rPr lang="fr-FR" dirty="0"/>
-              <a:t>Dans le cadre de notre simulation</a:t>
-            </a:r>
-          </a:p>
-        </p:txBody>
-      </p:sp>
-      <p:sp>
-        <p:nvSpPr>
-          <p:cNvPr id="3" name="Espace réservé du contenu 2">
-            <a:extLst>
-              <a:ext uri="{FF2B5EF4-FFF2-40B4-BE49-F238E27FC236}">
-                <a16:creationId xmlns:a16="http://schemas.microsoft.com/office/drawing/2014/main" id="{123A75CA-9333-F646-2851-6A9374EB6D47}"/>
-              </a:ext>
-            </a:extLst>
-          </p:cNvPr>
-          <p:cNvSpPr>
-            <a:spLocks noGrp="1"/>
-          </p:cNvSpPr>
-          <p:nvPr>
-            <p:ph idx="1"/>
-          </p:nvPr>
-        </p:nvSpPr>
-        <p:spPr/>
-        <p:txBody>
-          <a:bodyPr>
-            <a:normAutofit/>
-          </a:bodyPr>
-          <a:lstStyle/>
-          <a:p>
-            <a:pPr marL="0" indent="0">
-              <a:buNone/>
-            </a:pPr>
-            <a:r>
-              <a:rPr lang="fr-FR" dirty="0">
-                <a:latin typeface="Arial" panose="020B0604020202020204" pitchFamily="34" charset="0"/>
-                <a:cs typeface="Arial" panose="020B0604020202020204" pitchFamily="34" charset="0"/>
-              </a:rPr>
-              <a:t>Configuration du Routeur0</a:t>
-            </a:r>
-          </a:p>
-          <a:p>
-            <a:pPr marL="0" indent="0">
-              <a:buNone/>
-            </a:pPr>
-            <a:endParaRPr lang="fr-FR" dirty="0">
-              <a:latin typeface="Arial" panose="020B0604020202020204" pitchFamily="34" charset="0"/>
-              <a:cs typeface="Arial" panose="020B0604020202020204" pitchFamily="34" charset="0"/>
-            </a:endParaRPr>
-          </a:p>
-          <a:p>
-            <a:r>
-              <a:rPr lang="fr-FR" dirty="0">
-                <a:latin typeface="Arial" panose="020B0604020202020204" pitchFamily="34" charset="0"/>
-                <a:cs typeface="Arial" panose="020B0604020202020204" pitchFamily="34" charset="0"/>
-              </a:rPr>
-              <a:t>G0/0	IP : </a:t>
-            </a:r>
-            <a:r>
-              <a:rPr lang="fr-FR" b="0" i="0" dirty="0">
-                <a:solidFill>
-                  <a:srgbClr val="000000"/>
-                </a:solidFill>
-                <a:effectLst/>
-                <a:latin typeface="Arial" panose="020B0604020202020204" pitchFamily="34" charset="0"/>
-                <a:cs typeface="Arial" panose="020B0604020202020204" pitchFamily="34" charset="0"/>
-              </a:rPr>
-              <a:t>2001:db8:1:1</a:t>
-            </a:r>
-            <a:r>
-              <a:rPr lang="am-ET" b="0" i="0" dirty="0">
-                <a:solidFill>
-                  <a:srgbClr val="000000"/>
-                </a:solidFill>
-                <a:effectLst/>
-                <a:cs typeface="Arial" panose="020B0604020202020204" pitchFamily="34" charset="0"/>
-              </a:rPr>
-              <a:t>።1/64</a:t>
-            </a:r>
-            <a:r>
-              <a:rPr lang="en-US" dirty="0">
-                <a:solidFill>
-                  <a:srgbClr val="000000"/>
-                </a:solidFill>
-                <a:latin typeface="Arial" panose="020B0604020202020204" pitchFamily="34" charset="0"/>
-                <a:cs typeface="Arial" panose="020B0604020202020204" pitchFamily="34" charset="0"/>
-              </a:rPr>
-              <a:t>		</a:t>
-            </a:r>
-            <a:r>
-              <a:rPr lang="en-US" b="0" i="0" dirty="0">
-                <a:solidFill>
-                  <a:srgbClr val="000000"/>
-                </a:solidFill>
-                <a:effectLst/>
-                <a:latin typeface="Arial" panose="020B0604020202020204" pitchFamily="34" charset="0"/>
-                <a:cs typeface="Arial" panose="020B0604020202020204" pitchFamily="34" charset="0"/>
-              </a:rPr>
-              <a:t>local-link : fe80::1</a:t>
-            </a:r>
-          </a:p>
-          <a:p>
-            <a:r>
-              <a:rPr lang="fr-FR" dirty="0">
-                <a:latin typeface="Arial" panose="020B0604020202020204" pitchFamily="34" charset="0"/>
-                <a:cs typeface="Arial" panose="020B0604020202020204" pitchFamily="34" charset="0"/>
-              </a:rPr>
-              <a:t>G0/1	IP : </a:t>
-            </a:r>
-            <a:r>
-              <a:rPr lang="fr-FR" b="0" i="0" dirty="0">
-                <a:solidFill>
-                  <a:srgbClr val="000000"/>
-                </a:solidFill>
-                <a:effectLst/>
-                <a:latin typeface="Arial" panose="020B0604020202020204" pitchFamily="34" charset="0"/>
-                <a:cs typeface="Arial" panose="020B0604020202020204" pitchFamily="34" charset="0"/>
-              </a:rPr>
-              <a:t>2001:db8:1:2</a:t>
-            </a:r>
-            <a:r>
-              <a:rPr lang="am-ET" b="0" i="0" dirty="0">
-                <a:solidFill>
-                  <a:srgbClr val="000000"/>
-                </a:solidFill>
-                <a:effectLst/>
-                <a:cs typeface="Arial" panose="020B0604020202020204" pitchFamily="34" charset="0"/>
-              </a:rPr>
-              <a:t>።1/64</a:t>
-            </a:r>
-            <a:r>
-              <a:rPr lang="en-US" b="0" i="0" dirty="0">
-                <a:solidFill>
-                  <a:srgbClr val="000000"/>
-                </a:solidFill>
-                <a:effectLst/>
-                <a:latin typeface="Arial" panose="020B0604020202020204" pitchFamily="34" charset="0"/>
-                <a:cs typeface="Arial" panose="020B0604020202020204" pitchFamily="34" charset="0"/>
-              </a:rPr>
-              <a:t>  	</a:t>
-            </a:r>
-            <a:r>
-              <a:rPr lang="en-US" dirty="0">
-                <a:solidFill>
-                  <a:srgbClr val="000000"/>
-                </a:solidFill>
-                <a:latin typeface="Arial" panose="020B0604020202020204" pitchFamily="34" charset="0"/>
-                <a:cs typeface="Arial" panose="020B0604020202020204" pitchFamily="34" charset="0"/>
-              </a:rPr>
-              <a:t>	</a:t>
-            </a:r>
-            <a:r>
-              <a:rPr lang="en-US" b="0" i="0" dirty="0">
-                <a:solidFill>
-                  <a:srgbClr val="000000"/>
-                </a:solidFill>
-                <a:effectLst/>
-                <a:latin typeface="Arial" panose="020B0604020202020204" pitchFamily="34" charset="0"/>
-                <a:cs typeface="Arial" panose="020B0604020202020204" pitchFamily="34" charset="0"/>
-              </a:rPr>
-              <a:t>local-link : fe80::1</a:t>
-            </a:r>
-          </a:p>
-          <a:p>
-            <a:r>
-              <a:rPr lang="en-US" dirty="0">
-                <a:solidFill>
-                  <a:srgbClr val="000000"/>
-                </a:solidFill>
-                <a:latin typeface="Arial" panose="020B0604020202020204" pitchFamily="34" charset="0"/>
-                <a:cs typeface="Arial" panose="020B0604020202020204" pitchFamily="34" charset="0"/>
-              </a:rPr>
-              <a:t>S0/0/0	IP : 2001:db8:1:a001::2/64 	local-link : fe80::1</a:t>
-            </a:r>
-          </a:p>
-          <a:p>
-            <a:pPr marL="0" indent="0">
-              <a:buNone/>
-            </a:pPr>
-            <a:endParaRPr lang="fr-FR" dirty="0"/>
-          </a:p>
-          <a:p>
-            <a:pPr marL="0" indent="0">
-              <a:buNone/>
-            </a:pPr>
-            <a:endParaRPr lang="fr-FR" dirty="0"/>
-          </a:p>
-        </p:txBody>
-      </p:sp>
-    </p:spTree>
-    <p:extLst>
-      <p:ext uri="{BB962C8B-B14F-4D97-AF65-F5344CB8AC3E}">
-        <p14:creationId xmlns:p14="http://schemas.microsoft.com/office/powerpoint/2010/main" val="1232546669"/>
-      </p:ext>
-    </p:extLst>
-  </p:cSld>
-  <p:clrMapOvr>
-    <a:masterClrMapping/>
-  </p:clrMapOvr>
-</p:sld>
-</file>
-
-<file path=ppt/slides/slide4.xml><?xml version="1.0" encoding="utf-8"?>
-<p:sld xmlns:a="http://schemas.openxmlformats.org/drawingml/2006/main" xmlns:r="http://schemas.openxmlformats.org/officeDocument/2006/relationships" xmlns:p="http://schemas.openxmlformats.org/presentationml/2006/main">
-  <p:cSld>
-    <p:spTree>
-      <p:nvGrpSpPr>
-        <p:cNvPr id="1" name=""/>
-        <p:cNvGrpSpPr/>
-        <p:nvPr/>
-      </p:nvGrpSpPr>
-      <p:grpSpPr>
-        <a:xfrm>
-          <a:off x="0" y="0"/>
-          <a:ext cx="0" cy="0"/>
-          <a:chOff x="0" y="0"/>
-          <a:chExt cx="0" cy="0"/>
-        </a:xfrm>
-      </p:grpSpPr>
-      <p:sp>
-        <p:nvSpPr>
-          <p:cNvPr id="2" name="Titre 1">
-            <a:extLst>
-              <a:ext uri="{FF2B5EF4-FFF2-40B4-BE49-F238E27FC236}">
-                <a16:creationId xmlns:a16="http://schemas.microsoft.com/office/drawing/2014/main" id="{38E1B037-5E83-7AAB-116E-4A67F03A07AA}"/>
-              </a:ext>
-            </a:extLst>
-          </p:cNvPr>
-          <p:cNvSpPr>
-            <a:spLocks noGrp="1"/>
-          </p:cNvSpPr>
-          <p:nvPr>
-            <p:ph type="title"/>
-          </p:nvPr>
-        </p:nvSpPr>
-        <p:spPr/>
-        <p:txBody>
-          <a:bodyPr/>
-          <a:lstStyle/>
-          <a:p>
-            <a:r>
-              <a:rPr lang="en-US" dirty="0"/>
-              <a:t>Configuration des </a:t>
-            </a:r>
-            <a:r>
-              <a:rPr lang="en-US" dirty="0" err="1"/>
-              <a:t>Serveurs</a:t>
-            </a:r>
-            <a:endParaRPr lang="fr-FR" dirty="0"/>
-          </a:p>
-        </p:txBody>
-      </p:sp>
-      <p:sp>
-        <p:nvSpPr>
-          <p:cNvPr id="3" name="Espace réservé du contenu 2">
-            <a:extLst>
-              <a:ext uri="{FF2B5EF4-FFF2-40B4-BE49-F238E27FC236}">
-                <a16:creationId xmlns:a16="http://schemas.microsoft.com/office/drawing/2014/main" id="{D3636C3F-6EBE-097A-DD9E-9CAC674EEAB7}"/>
-              </a:ext>
-            </a:extLst>
-          </p:cNvPr>
-          <p:cNvSpPr>
-            <a:spLocks noGrp="1"/>
-          </p:cNvSpPr>
-          <p:nvPr>
-            <p:ph idx="1"/>
-          </p:nvPr>
-        </p:nvSpPr>
-        <p:spPr/>
-        <p:txBody>
-          <a:bodyPr/>
-          <a:lstStyle/>
-          <a:p>
-            <a:pPr marL="0" indent="0">
-              <a:buNone/>
-            </a:pPr>
-            <a:endParaRPr lang="en-US" dirty="0"/>
-          </a:p>
-          <a:p>
-            <a:pPr marL="0" indent="0">
-              <a:buNone/>
-            </a:pPr>
-            <a:r>
-              <a:rPr lang="en-US" dirty="0">
-                <a:latin typeface="Arial" panose="020B0604020202020204" pitchFamily="34" charset="0"/>
-                <a:cs typeface="Arial" panose="020B0604020202020204" pitchFamily="34" charset="0"/>
-              </a:rPr>
-              <a:t>Server </a:t>
-            </a:r>
-            <a:r>
-              <a:rPr lang="en-US" dirty="0" err="1">
-                <a:latin typeface="Arial" panose="020B0604020202020204" pitchFamily="34" charset="0"/>
-                <a:cs typeface="Arial" panose="020B0604020202020204" pitchFamily="34" charset="0"/>
-              </a:rPr>
-              <a:t>Compta</a:t>
-            </a:r>
-            <a:endParaRPr lang="en-US" dirty="0">
-              <a:latin typeface="Arial" panose="020B0604020202020204" pitchFamily="34" charset="0"/>
-              <a:cs typeface="Arial" panose="020B0604020202020204" pitchFamily="34" charset="0"/>
-            </a:endParaRPr>
-          </a:p>
-          <a:p>
-            <a:pPr marL="0" indent="0">
-              <a:buNone/>
-            </a:pPr>
-            <a:r>
-              <a:rPr lang="en-US" dirty="0">
-                <a:latin typeface="Arial" panose="020B0604020202020204" pitchFamily="34" charset="0"/>
-                <a:cs typeface="Arial" panose="020B0604020202020204" pitchFamily="34" charset="0"/>
-              </a:rPr>
-              <a:t>	IPv6 : 2001:db8:1:1::2/64 	</a:t>
-            </a:r>
-            <a:r>
-              <a:rPr lang="en-US" b="0" i="0" dirty="0">
-                <a:solidFill>
-                  <a:srgbClr val="000000"/>
-                </a:solidFill>
-                <a:effectLst/>
-                <a:latin typeface="Arial" panose="020B0604020202020204" pitchFamily="34" charset="0"/>
-                <a:cs typeface="Arial" panose="020B0604020202020204" pitchFamily="34" charset="0"/>
-              </a:rPr>
-              <a:t>local-link : fe80::1</a:t>
-            </a:r>
-          </a:p>
-          <a:p>
-            <a:pPr marL="0" indent="0">
-              <a:buNone/>
-            </a:pPr>
-            <a:endParaRPr lang="en-US" dirty="0">
-              <a:solidFill>
-                <a:srgbClr val="000000"/>
-              </a:solidFill>
-              <a:latin typeface="Arial" panose="020B0604020202020204" pitchFamily="34" charset="0"/>
-              <a:cs typeface="Arial" panose="020B0604020202020204" pitchFamily="34" charset="0"/>
-            </a:endParaRPr>
-          </a:p>
-          <a:p>
-            <a:pPr marL="0" indent="0">
-              <a:buNone/>
-            </a:pPr>
-            <a:r>
-              <a:rPr lang="en-US" dirty="0">
-                <a:solidFill>
-                  <a:srgbClr val="000000"/>
-                </a:solidFill>
-                <a:latin typeface="Arial" panose="020B0604020202020204" pitchFamily="34" charset="0"/>
-                <a:cs typeface="Arial" panose="020B0604020202020204" pitchFamily="34" charset="0"/>
-              </a:rPr>
-              <a:t>Server Production</a:t>
-            </a:r>
-          </a:p>
-          <a:p>
-            <a:pPr marL="0" indent="0">
-              <a:buNone/>
-            </a:pPr>
-            <a:r>
-              <a:rPr lang="en-US" b="0" i="0" dirty="0">
-                <a:solidFill>
-                  <a:srgbClr val="000000"/>
-                </a:solidFill>
-                <a:effectLst/>
-                <a:latin typeface="Arial" panose="020B0604020202020204" pitchFamily="34" charset="0"/>
-                <a:cs typeface="Arial" panose="020B0604020202020204" pitchFamily="34" charset="0"/>
-              </a:rPr>
-              <a:t>	IPv6 : 2001:db8:2:1::2/64 	local-link : fe80::1</a:t>
-            </a:r>
-          </a:p>
-          <a:p>
-            <a:pPr marL="0" indent="0">
-              <a:buNone/>
-            </a:pPr>
-            <a:endParaRPr lang="en-US" b="0" i="0" dirty="0">
-              <a:solidFill>
-                <a:srgbClr val="000000"/>
-              </a:solidFill>
-              <a:effectLst/>
-              <a:latin typeface="Arial" panose="020B0604020202020204" pitchFamily="34" charset="0"/>
-              <a:cs typeface="Arial" panose="020B0604020202020204" pitchFamily="34" charset="0"/>
-            </a:endParaRPr>
-          </a:p>
-          <a:p>
-            <a:pPr marL="0" indent="0">
-              <a:buNone/>
-            </a:pPr>
-            <a:endParaRPr lang="en-US" b="0" i="0" dirty="0">
-              <a:solidFill>
-                <a:srgbClr val="000000"/>
-              </a:solidFill>
-              <a:effectLst/>
-              <a:latin typeface="Arial" panose="020B0604020202020204" pitchFamily="34" charset="0"/>
-              <a:cs typeface="Arial" panose="020B0604020202020204" pitchFamily="34" charset="0"/>
-            </a:endParaRPr>
-          </a:p>
-          <a:p>
-            <a:pPr marL="0" indent="0">
-              <a:buNone/>
-            </a:pPr>
-            <a:endParaRPr lang="en-US" dirty="0"/>
-          </a:p>
-          <a:p>
-            <a:pPr marL="0" indent="0">
-              <a:buNone/>
-            </a:pPr>
-            <a:endParaRPr lang="fr-FR" dirty="0"/>
-          </a:p>
-        </p:txBody>
-      </p:sp>
-    </p:spTree>
-    <p:extLst>
-      <p:ext uri="{BB962C8B-B14F-4D97-AF65-F5344CB8AC3E}">
-        <p14:creationId xmlns:p14="http://schemas.microsoft.com/office/powerpoint/2010/main" val="3837362887"/>
-      </p:ext>
-    </p:extLst>
-  </p:cSld>
-  <p:clrMapOvr>
-    <a:masterClrMapping/>
-  </p:clrMapOvr>
-</p:sld>
-</file>
-
-<file path=ppt/slides/slide5.xml><?xml version="1.0" encoding="utf-8"?>
-<p:sld xmlns:a="http://schemas.openxmlformats.org/drawingml/2006/main" xmlns:r="http://schemas.openxmlformats.org/officeDocument/2006/relationships" xmlns:p="http://schemas.openxmlformats.org/presentationml/2006/main">
-  <p:cSld>
-    <p:spTree>
-      <p:nvGrpSpPr>
-        <p:cNvPr id="1" name=""/>
-        <p:cNvGrpSpPr/>
-        <p:nvPr/>
-      </p:nvGrpSpPr>
-      <p:grpSpPr>
-        <a:xfrm>
-          <a:off x="0" y="0"/>
-          <a:ext cx="0" cy="0"/>
-          <a:chOff x="0" y="0"/>
-          <a:chExt cx="0" cy="0"/>
-        </a:xfrm>
-      </p:grpSpPr>
-      <p:sp>
-        <p:nvSpPr>
-          <p:cNvPr id="2" name="Titre 1">
-            <a:extLst>
-              <a:ext uri="{FF2B5EF4-FFF2-40B4-BE49-F238E27FC236}">
-                <a16:creationId xmlns:a16="http://schemas.microsoft.com/office/drawing/2014/main" id="{A1FFD033-0AC4-05BA-9293-396ACEDC9DF2}"/>
-              </a:ext>
-            </a:extLst>
-          </p:cNvPr>
-          <p:cNvSpPr>
-            <a:spLocks noGrp="1"/>
-          </p:cNvSpPr>
-          <p:nvPr>
-            <p:ph type="title"/>
-          </p:nvPr>
-        </p:nvSpPr>
-        <p:spPr/>
-        <p:txBody>
-          <a:bodyPr/>
-          <a:lstStyle/>
-          <a:p>
-            <a:r>
-              <a:rPr lang="en-US" dirty="0"/>
-              <a:t>Configuration des clients</a:t>
-            </a:r>
-            <a:endParaRPr lang="fr-FR" dirty="0"/>
-          </a:p>
-        </p:txBody>
-      </p:sp>
-      <p:sp>
-        <p:nvSpPr>
-          <p:cNvPr id="3" name="Espace réservé du contenu 2">
-            <a:extLst>
-              <a:ext uri="{FF2B5EF4-FFF2-40B4-BE49-F238E27FC236}">
-                <a16:creationId xmlns:a16="http://schemas.microsoft.com/office/drawing/2014/main" id="{2C27FFD4-EA57-1E49-9EF4-3CB4295B4BC9}"/>
-              </a:ext>
-            </a:extLst>
-          </p:cNvPr>
-          <p:cNvSpPr>
-            <a:spLocks noGrp="1"/>
-          </p:cNvSpPr>
-          <p:nvPr>
-            <p:ph idx="1"/>
-          </p:nvPr>
-        </p:nvSpPr>
-        <p:spPr/>
-        <p:txBody>
-          <a:bodyPr/>
-          <a:lstStyle/>
-          <a:p>
-            <a:pPr marL="0" indent="0">
-              <a:buNone/>
-            </a:pPr>
-            <a:r>
-              <a:rPr lang="en-US" sz="3200" dirty="0"/>
-              <a:t>Test de la configuration</a:t>
-            </a:r>
-          </a:p>
-          <a:p>
-            <a:pPr marL="0" indent="0">
-              <a:buNone/>
-            </a:pPr>
-            <a:r>
-              <a:rPr lang="en-US" sz="3200" dirty="0"/>
-              <a:t>Experimentation</a:t>
-            </a:r>
-          </a:p>
-          <a:p>
-            <a:pPr marL="0" indent="0">
-              <a:buNone/>
-            </a:pPr>
-            <a:endParaRPr lang="en-US" dirty="0"/>
-          </a:p>
-          <a:p>
-            <a:pPr marL="0" indent="0">
-              <a:buNone/>
-            </a:pPr>
-            <a:endParaRPr lang="fr-FR" dirty="0"/>
-          </a:p>
-          <a:p>
-            <a:pPr marL="0" indent="0">
-              <a:buNone/>
-            </a:pPr>
-            <a:r>
-              <a:rPr lang="fr-FR" dirty="0"/>
-              <a:t>Je vous retrouve tous de suite sur Cisco </a:t>
-            </a:r>
-            <a:r>
-              <a:rPr lang="fr-FR" dirty="0" err="1"/>
-              <a:t>Packet</a:t>
-            </a:r>
-            <a:r>
-              <a:rPr lang="fr-FR" dirty="0"/>
-              <a:t> Tracer</a:t>
-            </a:r>
-          </a:p>
-          <a:p>
-            <a:pPr marL="0" indent="0">
-              <a:buNone/>
-            </a:pPr>
-            <a:endParaRPr lang="fr-FR" dirty="0"/>
-          </a:p>
-        </p:txBody>
-      </p:sp>
-    </p:spTree>
-    <p:extLst>
-      <p:ext uri="{BB962C8B-B14F-4D97-AF65-F5344CB8AC3E}">
-        <p14:creationId xmlns:p14="http://schemas.microsoft.com/office/powerpoint/2010/main" val="1477998346"/>
-      </p:ext>
-    </p:extLst>
-  </p:cSld>
-  <p:clrMapOvr>
-    <a:masterClrMapping/>
-  </p:clrMapOvr>
-</p:sld>
-</file>
-
-<file path=ppt/slides/slide6.xml><?xml version="1.0" encoding="utf-8"?>
-<p:sld xmlns:a="http://schemas.openxmlformats.org/drawingml/2006/main" xmlns:r="http://schemas.openxmlformats.org/officeDocument/2006/relationships" xmlns:p="http://schemas.openxmlformats.org/presentationml/2006/main">
-  <p:cSld>
-    <p:spTree>
-      <p:nvGrpSpPr>
-        <p:cNvPr id="1" name=""/>
-        <p:cNvGrpSpPr/>
-        <p:nvPr/>
-      </p:nvGrpSpPr>
-      <p:grpSpPr>
-        <a:xfrm>
-          <a:off x="0" y="0"/>
-          <a:ext cx="0" cy="0"/>
-          <a:chOff x="0" y="0"/>
-          <a:chExt cx="0" cy="0"/>
-        </a:xfrm>
-      </p:grpSpPr>
       <p:pic>
         <p:nvPicPr>
-          <p:cNvPr id="4" name="Image 3">
-            <a:extLst>
-              <a:ext uri="{FF2B5EF4-FFF2-40B4-BE49-F238E27FC236}">
-                <a16:creationId xmlns:a16="http://schemas.microsoft.com/office/drawing/2014/main" id="{0FCE91B7-730D-DF3E-9E49-1BB778C54DCC}"/>
+          <p:cNvPr id="5" name="Image 4">
+            <a:extLst>
+              <a:ext uri="{FF2B5EF4-FFF2-40B4-BE49-F238E27FC236}">
+                <a16:creationId xmlns:a16="http://schemas.microsoft.com/office/drawing/2014/main" id="{CC8796E8-11EC-138D-4F94-27B601123802}"/>
               </a:ext>
             </a:extLst>
           </p:cNvPr>
@@ -4331,8 +3507,8 @@
         </p:blipFill>
         <p:spPr>
           <a:xfrm>
-            <a:off x="0" y="-633983"/>
-            <a:ext cx="12191999" cy="8125966"/>
+            <a:off x="0" y="0"/>
+            <a:ext cx="12192000" cy="7040880"/>
           </a:xfrm>
           <a:prstGeom prst="rect">
             <a:avLst/>
@@ -4357,7 +3533,7 @@
         </p:nvSpPr>
         <p:spPr>
           <a:xfrm>
-            <a:off x="838199" y="140839"/>
+            <a:off x="838199" y="495402"/>
             <a:ext cx="10515600" cy="1325563"/>
           </a:xfrm>
         </p:spPr>
@@ -4421,7 +3597,7 @@
         </p:nvSpPr>
         <p:spPr>
           <a:xfrm>
-            <a:off x="3891951" y="5129542"/>
+            <a:off x="5367068" y="5526357"/>
             <a:ext cx="9263332" cy="1443786"/>
           </a:xfrm>
         </p:spPr>
@@ -4433,7 +3609,7 @@
               <a:buNone/>
             </a:pPr>
             <a:r>
-              <a:rPr lang="en-US" sz="4000" dirty="0">
+              <a:rPr lang="en-US" sz="5400" dirty="0">
                 <a:solidFill>
                   <a:schemeClr val="bg1"/>
                 </a:solidFill>
@@ -4463,7 +3639,7 @@
 </p:sld>
 </file>
 
-<file path=ppt/slides/slide7.xml><?xml version="1.0" encoding="utf-8"?>
+<file path=ppt/slides/slide3.xml><?xml version="1.0" encoding="utf-8"?>
 <p:sld xmlns:a="http://schemas.openxmlformats.org/drawingml/2006/main" xmlns:r="http://schemas.openxmlformats.org/officeDocument/2006/relationships" xmlns:p="http://schemas.openxmlformats.org/presentationml/2006/main">
   <p:cSld>
     <p:spTree>

</xml_diff>